<commit_message>
Atualizando aula 03 - PPTX
</commit_message>
<xml_diff>
--- a/RaciocinioAlgoritmico/Aula 03 - Estruturas de Seleção Múltiplas (ELIF)/Aula 03 - Estruturas de Seleção Múltiplas (ELIF).pptx
+++ b/RaciocinioAlgoritmico/Aula 03 - Estruturas de Seleção Múltiplas (ELIF)/Aula 03 - Estruturas de Seleção Múltiplas (ELIF).pptx
@@ -300,7 +300,7 @@
             <a:pPr algn="r">
               <a:buNone/>
             </a:pPr>
-            <a:fld id="{396F19F5-950C-4797-B746-48D700D0708E}" type="slidenum">
+            <a:fld id="{05F64E71-F24D-422E-B1F8-EA5F0DEACAB0}" type="slidenum">
               <a:rPr b="0" lang="pt-BR" sz="1400" spc="-1" strike="noStrike">
                 <a:latin typeface="Times New Roman"/>
               </a:rPr>
@@ -348,7 +348,7 @@
         <p:spPr>
           <a:xfrm>
             <a:off x="1498680" y="1200240"/>
-            <a:ext cx="4311000" cy="3233160"/>
+            <a:ext cx="4310640" cy="3232800"/>
           </a:xfrm>
           <a:prstGeom prst="rect">
             <a:avLst/>
@@ -371,7 +371,7 @@
         <p:spPr>
           <a:xfrm>
             <a:off x="731520" y="4620240"/>
-            <a:ext cx="5843880" cy="3772800"/>
+            <a:ext cx="5843520" cy="3772440"/>
           </a:xfrm>
           <a:prstGeom prst="rect">
             <a:avLst/>
@@ -401,7 +401,7 @@
         <p:spPr>
           <a:xfrm>
             <a:off x="0" y="9119520"/>
-            <a:ext cx="3161880" cy="474120"/>
+            <a:ext cx="3161520" cy="473760"/>
           </a:xfrm>
           <a:prstGeom prst="rect">
             <a:avLst/>
@@ -479,7 +479,7 @@
         <p:spPr>
           <a:xfrm>
             <a:off x="1498680" y="1200240"/>
-            <a:ext cx="4311000" cy="3233160"/>
+            <a:ext cx="4310640" cy="3232800"/>
           </a:xfrm>
           <a:prstGeom prst="rect">
             <a:avLst/>
@@ -502,7 +502,7 @@
         <p:spPr>
           <a:xfrm>
             <a:off x="731520" y="4620240"/>
-            <a:ext cx="5843520" cy="3772440"/>
+            <a:ext cx="5843160" cy="3772080"/>
           </a:xfrm>
           <a:prstGeom prst="rect">
             <a:avLst/>
@@ -532,7 +532,7 @@
         <p:spPr>
           <a:xfrm>
             <a:off x="0" y="9119520"/>
-            <a:ext cx="3161520" cy="473760"/>
+            <a:ext cx="3161160" cy="473400"/>
           </a:xfrm>
           <a:prstGeom prst="rect">
             <a:avLst/>
@@ -610,7 +610,7 @@
         <p:spPr>
           <a:xfrm>
             <a:off x="1498680" y="1200240"/>
-            <a:ext cx="4311000" cy="3233160"/>
+            <a:ext cx="4310640" cy="3232800"/>
           </a:xfrm>
           <a:prstGeom prst="rect">
             <a:avLst/>
@@ -633,7 +633,7 @@
         <p:spPr>
           <a:xfrm>
             <a:off x="731520" y="4620240"/>
-            <a:ext cx="5843880" cy="3772800"/>
+            <a:ext cx="5843520" cy="3772440"/>
           </a:xfrm>
           <a:prstGeom prst="rect">
             <a:avLst/>
@@ -663,7 +663,7 @@
         <p:spPr>
           <a:xfrm>
             <a:off x="0" y="9119520"/>
-            <a:ext cx="3161880" cy="474120"/>
+            <a:ext cx="3161520" cy="473760"/>
           </a:xfrm>
           <a:prstGeom prst="rect">
             <a:avLst/>
@@ -741,7 +741,7 @@
         <p:spPr>
           <a:xfrm>
             <a:off x="1498680" y="1200240"/>
-            <a:ext cx="4311000" cy="3233160"/>
+            <a:ext cx="4310640" cy="3232800"/>
           </a:xfrm>
           <a:prstGeom prst="rect">
             <a:avLst/>
@@ -764,7 +764,7 @@
         <p:spPr>
           <a:xfrm>
             <a:off x="731520" y="4620240"/>
-            <a:ext cx="5843880" cy="3772800"/>
+            <a:ext cx="5843520" cy="3772440"/>
           </a:xfrm>
           <a:prstGeom prst="rect">
             <a:avLst/>
@@ -794,7 +794,7 @@
         <p:spPr>
           <a:xfrm>
             <a:off x="0" y="9119520"/>
-            <a:ext cx="3161880" cy="474120"/>
+            <a:ext cx="3161520" cy="473760"/>
           </a:xfrm>
           <a:prstGeom prst="rect">
             <a:avLst/>
@@ -872,7 +872,7 @@
         <p:spPr>
           <a:xfrm>
             <a:off x="1498680" y="1200240"/>
-            <a:ext cx="4311000" cy="3233160"/>
+            <a:ext cx="4310640" cy="3232800"/>
           </a:xfrm>
           <a:prstGeom prst="rect">
             <a:avLst/>
@@ -895,7 +895,7 @@
         <p:spPr>
           <a:xfrm>
             <a:off x="731520" y="4620240"/>
-            <a:ext cx="5843880" cy="3772800"/>
+            <a:ext cx="5843520" cy="3772440"/>
           </a:xfrm>
           <a:prstGeom prst="rect">
             <a:avLst/>
@@ -925,7 +925,7 @@
         <p:spPr>
           <a:xfrm>
             <a:off x="0" y="9119520"/>
-            <a:ext cx="3161880" cy="474120"/>
+            <a:ext cx="3161520" cy="473760"/>
           </a:xfrm>
           <a:prstGeom prst="rect">
             <a:avLst/>
@@ -1003,7 +1003,7 @@
         <p:spPr>
           <a:xfrm>
             <a:off x="1498680" y="1200240"/>
-            <a:ext cx="4311000" cy="3233160"/>
+            <a:ext cx="4310640" cy="3232800"/>
           </a:xfrm>
           <a:prstGeom prst="rect">
             <a:avLst/>
@@ -1026,7 +1026,7 @@
         <p:spPr>
           <a:xfrm>
             <a:off x="731520" y="4620240"/>
-            <a:ext cx="5843880" cy="3772800"/>
+            <a:ext cx="5843520" cy="3772440"/>
           </a:xfrm>
           <a:prstGeom prst="rect">
             <a:avLst/>
@@ -1056,7 +1056,7 @@
         <p:spPr>
           <a:xfrm>
             <a:off x="0" y="9119520"/>
-            <a:ext cx="3161880" cy="474120"/>
+            <a:ext cx="3161520" cy="473760"/>
           </a:xfrm>
           <a:prstGeom prst="rect">
             <a:avLst/>
@@ -1134,7 +1134,7 @@
         <p:spPr>
           <a:xfrm>
             <a:off x="1498680" y="1200240"/>
-            <a:ext cx="4311000" cy="3233160"/>
+            <a:ext cx="4310640" cy="3232800"/>
           </a:xfrm>
           <a:prstGeom prst="rect">
             <a:avLst/>
@@ -1157,7 +1157,7 @@
         <p:spPr>
           <a:xfrm>
             <a:off x="731520" y="4620240"/>
-            <a:ext cx="5843880" cy="3772800"/>
+            <a:ext cx="5843520" cy="3772440"/>
           </a:xfrm>
           <a:prstGeom prst="rect">
             <a:avLst/>
@@ -1187,7 +1187,7 @@
         <p:spPr>
           <a:xfrm>
             <a:off x="0" y="9119520"/>
-            <a:ext cx="3161880" cy="474120"/>
+            <a:ext cx="3161520" cy="473760"/>
           </a:xfrm>
           <a:prstGeom prst="rect">
             <a:avLst/>
@@ -5840,7 +5840,7 @@
         <p:spPr>
           <a:xfrm>
             <a:off x="0" y="3150000"/>
-            <a:ext cx="9711720" cy="1251720"/>
+            <a:ext cx="9711360" cy="1251360"/>
           </a:xfrm>
           <a:prstGeom prst="rect">
             <a:avLst/>
@@ -6138,7 +6138,7 @@
         <p:spPr>
           <a:xfrm>
             <a:off x="0" y="180000"/>
-            <a:ext cx="9711360" cy="1251360"/>
+            <a:ext cx="9711000" cy="1251000"/>
           </a:xfrm>
           <a:prstGeom prst="rect">
             <a:avLst/>
@@ -6166,7 +6166,7 @@
         <p:spPr>
           <a:xfrm>
             <a:off x="7560000" y="6840000"/>
-            <a:ext cx="2511360" cy="531360"/>
+            <a:ext cx="2511000" cy="531000"/>
           </a:xfrm>
           <a:prstGeom prst="rect">
             <a:avLst/>
@@ -6194,7 +6194,7 @@
         <p:spPr>
           <a:xfrm>
             <a:off x="900000" y="6840000"/>
-            <a:ext cx="6471360" cy="531360"/>
+            <a:ext cx="6471000" cy="531000"/>
           </a:xfrm>
           <a:prstGeom prst="rect">
             <a:avLst/>
@@ -6222,7 +6222,7 @@
         <p:spPr>
           <a:xfrm>
             <a:off x="180000" y="6840000"/>
-            <a:ext cx="531360" cy="531360"/>
+            <a:ext cx="531000" cy="531000"/>
           </a:xfrm>
           <a:prstGeom prst="rect">
             <a:avLst/>
@@ -6252,7 +6252,7 @@
         <p:spPr>
           <a:xfrm>
             <a:off x="504000" y="301320"/>
-            <a:ext cx="9071640" cy="1261440"/>
+            <a:ext cx="9072000" cy="1261800"/>
           </a:xfrm>
           <a:prstGeom prst="rect">
             <a:avLst/>
@@ -6267,13 +6267,16 @@
             <a:noAutofit/>
           </a:bodyPr>
           <a:p>
-            <a:r>
-              <a:rPr b="0" lang="pt-BR" sz="1800" spc="-1" strike="noStrike">
+            <a:pPr algn="ctr">
+              <a:buNone/>
+            </a:pPr>
+            <a:r>
+              <a:rPr b="0" lang="pt-BR" sz="4400" spc="-1" strike="noStrike">
                 <a:latin typeface="Arial"/>
               </a:rPr>
               <a:t>Click to edit the title text format</a:t>
             </a:r>
-            <a:endParaRPr b="0" lang="pt-BR" sz="1800" spc="-1" strike="noStrike">
+            <a:endParaRPr b="0" lang="pt-BR" sz="4400" spc="-1" strike="noStrike">
               <a:latin typeface="Arial"/>
             </a:endParaRPr>
           </a:p>
@@ -6292,7 +6295,7 @@
         <p:spPr>
           <a:xfrm>
             <a:off x="504000" y="1768680"/>
-            <a:ext cx="9071640" cy="4383720"/>
+            <a:ext cx="9072000" cy="4384080"/>
           </a:xfrm>
           <a:prstGeom prst="rect">
             <a:avLst/>
@@ -6319,12 +6322,12 @@
               <a:buChar char=""/>
             </a:pPr>
             <a:r>
-              <a:rPr b="0" lang="pt-BR" sz="1800" spc="-1" strike="noStrike">
+              <a:rPr b="0" lang="pt-BR" sz="3200" spc="-1" strike="noStrike">
                 <a:latin typeface="Arial"/>
               </a:rPr>
               <a:t>Click to edit the outline text format</a:t>
             </a:r>
-            <a:endParaRPr b="0" lang="pt-BR" sz="1800" spc="-1" strike="noStrike">
+            <a:endParaRPr b="0" lang="pt-BR" sz="3200" spc="-1" strike="noStrike">
               <a:latin typeface="Arial"/>
             </a:endParaRPr>
           </a:p>
@@ -6341,12 +6344,12 @@
               <a:buChar char=""/>
             </a:pPr>
             <a:r>
-              <a:rPr b="0" lang="pt-BR" sz="1800" spc="-1" strike="noStrike">
+              <a:rPr b="0" lang="pt-BR" sz="2800" spc="-1" strike="noStrike">
                 <a:latin typeface="Arial"/>
               </a:rPr>
               <a:t>Second Outline Level</a:t>
             </a:r>
-            <a:endParaRPr b="0" lang="pt-BR" sz="1800" spc="-1" strike="noStrike">
+            <a:endParaRPr b="0" lang="pt-BR" sz="2800" spc="-1" strike="noStrike">
               <a:latin typeface="Arial"/>
             </a:endParaRPr>
           </a:p>
@@ -6363,12 +6366,12 @@
               <a:buChar char=""/>
             </a:pPr>
             <a:r>
-              <a:rPr b="0" lang="pt-BR" sz="1800" spc="-1" strike="noStrike">
+              <a:rPr b="0" lang="pt-BR" sz="2400" spc="-1" strike="noStrike">
                 <a:latin typeface="Arial"/>
               </a:rPr>
               <a:t>Third Outline Level</a:t>
             </a:r>
-            <a:endParaRPr b="0" lang="pt-BR" sz="1800" spc="-1" strike="noStrike">
+            <a:endParaRPr b="0" lang="pt-BR" sz="2400" spc="-1" strike="noStrike">
               <a:latin typeface="Arial"/>
             </a:endParaRPr>
           </a:p>
@@ -6385,12 +6388,12 @@
               <a:buChar char=""/>
             </a:pPr>
             <a:r>
-              <a:rPr b="0" lang="pt-BR" sz="1800" spc="-1" strike="noStrike">
+              <a:rPr b="0" lang="pt-BR" sz="2000" spc="-1" strike="noStrike">
                 <a:latin typeface="Arial"/>
               </a:rPr>
               <a:t>Fourth Outline Level</a:t>
             </a:r>
-            <a:endParaRPr b="0" lang="pt-BR" sz="1800" spc="-1" strike="noStrike">
+            <a:endParaRPr b="0" lang="pt-BR" sz="2000" spc="-1" strike="noStrike">
               <a:latin typeface="Arial"/>
             </a:endParaRPr>
           </a:p>
@@ -6407,12 +6410,12 @@
               <a:buChar char=""/>
             </a:pPr>
             <a:r>
-              <a:rPr b="0" lang="pt-BR" sz="1800" spc="-1" strike="noStrike">
+              <a:rPr b="0" lang="pt-BR" sz="2000" spc="-1" strike="noStrike">
                 <a:latin typeface="Arial"/>
               </a:rPr>
               <a:t>Fifth Outline Level</a:t>
             </a:r>
-            <a:endParaRPr b="0" lang="pt-BR" sz="1800" spc="-1" strike="noStrike">
+            <a:endParaRPr b="0" lang="pt-BR" sz="2000" spc="-1" strike="noStrike">
               <a:latin typeface="Arial"/>
             </a:endParaRPr>
           </a:p>
@@ -6429,12 +6432,12 @@
               <a:buChar char=""/>
             </a:pPr>
             <a:r>
-              <a:rPr b="0" lang="pt-BR" sz="1800" spc="-1" strike="noStrike">
+              <a:rPr b="0" lang="pt-BR" sz="2000" spc="-1" strike="noStrike">
                 <a:latin typeface="Arial"/>
               </a:rPr>
               <a:t>Sixth Outline Level</a:t>
             </a:r>
-            <a:endParaRPr b="0" lang="pt-BR" sz="1800" spc="-1" strike="noStrike">
+            <a:endParaRPr b="0" lang="pt-BR" sz="2000" spc="-1" strike="noStrike">
               <a:latin typeface="Arial"/>
             </a:endParaRPr>
           </a:p>
@@ -6451,12 +6454,12 @@
               <a:buChar char=""/>
             </a:pPr>
             <a:r>
-              <a:rPr b="0" lang="pt-BR" sz="1800" spc="-1" strike="noStrike">
+              <a:rPr b="0" lang="pt-BR" sz="2000" spc="-1" strike="noStrike">
                 <a:latin typeface="Arial"/>
               </a:rPr>
               <a:t>Seventh Outline Level</a:t>
             </a:r>
-            <a:endParaRPr b="0" lang="pt-BR" sz="1800" spc="-1" strike="noStrike">
+            <a:endParaRPr b="0" lang="pt-BR" sz="2000" spc="-1" strike="noStrike">
               <a:latin typeface="Arial"/>
             </a:endParaRPr>
           </a:p>
@@ -6515,7 +6518,7 @@
         <p:spPr>
           <a:xfrm>
             <a:off x="0" y="180000"/>
-            <a:ext cx="9711720" cy="1251720"/>
+            <a:ext cx="9711360" cy="1251360"/>
           </a:xfrm>
           <a:prstGeom prst="rect">
             <a:avLst/>
@@ -6543,7 +6546,7 @@
         <p:spPr>
           <a:xfrm>
             <a:off x="7560000" y="6840000"/>
-            <a:ext cx="2511720" cy="531720"/>
+            <a:ext cx="2511360" cy="531360"/>
           </a:xfrm>
           <a:prstGeom prst="rect">
             <a:avLst/>
@@ -6571,7 +6574,7 @@
         <p:spPr>
           <a:xfrm>
             <a:off x="900000" y="6840000"/>
-            <a:ext cx="6471720" cy="531720"/>
+            <a:ext cx="6471360" cy="531360"/>
           </a:xfrm>
           <a:prstGeom prst="rect">
             <a:avLst/>
@@ -6599,7 +6602,7 @@
         <p:spPr>
           <a:xfrm>
             <a:off x="180000" y="6840000"/>
-            <a:ext cx="531720" cy="531720"/>
+            <a:ext cx="531360" cy="531360"/>
           </a:xfrm>
           <a:prstGeom prst="rect">
             <a:avLst/>
@@ -6888,7 +6891,7 @@
         <p:spPr>
           <a:xfrm>
             <a:off x="360000" y="3330000"/>
-            <a:ext cx="9351720" cy="891720"/>
+            <a:ext cx="9351360" cy="891360"/>
           </a:xfrm>
           <a:prstGeom prst="rect">
             <a:avLst/>
@@ -6940,7 +6943,7 @@
         <p:spPr>
           <a:xfrm>
             <a:off x="540000" y="4680000"/>
-            <a:ext cx="9171720" cy="2511720"/>
+            <a:ext cx="9171360" cy="2511360"/>
           </a:xfrm>
           <a:prstGeom prst="rect">
             <a:avLst/>
@@ -7077,7 +7080,7 @@
         <p:spPr>
           <a:xfrm>
             <a:off x="360000" y="360000"/>
-            <a:ext cx="9351360" cy="891360"/>
+            <a:ext cx="9351000" cy="891000"/>
           </a:xfrm>
           <a:prstGeom prst="rect">
             <a:avLst/>
@@ -7129,7 +7132,7 @@
         <p:spPr>
           <a:xfrm>
             <a:off x="360000" y="1980000"/>
-            <a:ext cx="9171360" cy="4671360"/>
+            <a:ext cx="9171000" cy="4671000"/>
           </a:xfrm>
           <a:prstGeom prst="rect">
             <a:avLst/>
@@ -7261,7 +7264,7 @@
         <p:spPr>
           <a:xfrm>
             <a:off x="897120" y="6886080"/>
-            <a:ext cx="6438600" cy="356400"/>
+            <a:ext cx="6438240" cy="356040"/>
           </a:xfrm>
           <a:prstGeom prst="rect">
             <a:avLst/>
@@ -7313,7 +7316,7 @@
         <p:spPr>
           <a:xfrm>
             <a:off x="7608600" y="6886080"/>
-            <a:ext cx="2276640" cy="356400"/>
+            <a:ext cx="2276280" cy="356040"/>
           </a:xfrm>
           <a:prstGeom prst="rect">
             <a:avLst/>
@@ -7369,7 +7372,7 @@
         <p:spPr>
           <a:xfrm>
             <a:off x="2376000" y="3714120"/>
-            <a:ext cx="5759640" cy="2741760"/>
+            <a:ext cx="5759280" cy="2741400"/>
           </a:xfrm>
           <a:prstGeom prst="rect">
             <a:avLst/>
@@ -7388,7 +7391,7 @@
         <p:spPr>
           <a:xfrm>
             <a:off x="2870640" y="4881600"/>
-            <a:ext cx="263880" cy="263880"/>
+            <a:ext cx="263520" cy="263520"/>
           </a:xfrm>
           <a:prstGeom prst="ellipse">
             <a:avLst/>
@@ -7418,7 +7421,7 @@
         <p:spPr>
           <a:xfrm>
             <a:off x="3230640" y="4881600"/>
-            <a:ext cx="263880" cy="263880"/>
+            <a:ext cx="263520" cy="263520"/>
           </a:xfrm>
           <a:prstGeom prst="ellipse">
             <a:avLst/>
@@ -7448,7 +7451,7 @@
         <p:spPr>
           <a:xfrm>
             <a:off x="3590640" y="4881600"/>
-            <a:ext cx="263880" cy="263880"/>
+            <a:ext cx="263520" cy="263520"/>
           </a:xfrm>
           <a:prstGeom prst="ellipse">
             <a:avLst/>
@@ -7508,7 +7511,7 @@
         <p:spPr>
           <a:xfrm>
             <a:off x="360000" y="360000"/>
-            <a:ext cx="9351720" cy="891720"/>
+            <a:ext cx="9351360" cy="891360"/>
           </a:xfrm>
           <a:prstGeom prst="rect">
             <a:avLst/>
@@ -7560,7 +7563,7 @@
         <p:spPr>
           <a:xfrm>
             <a:off x="540000" y="2154240"/>
-            <a:ext cx="4921560" cy="1112040"/>
+            <a:ext cx="4921200" cy="1112040"/>
           </a:xfrm>
           <a:prstGeom prst="rect">
             <a:avLst/>
@@ -7645,7 +7648,7 @@
         <p:spPr>
           <a:xfrm>
             <a:off x="897120" y="6886080"/>
-            <a:ext cx="6438960" cy="356760"/>
+            <a:ext cx="6438600" cy="356400"/>
           </a:xfrm>
           <a:prstGeom prst="rect">
             <a:avLst/>
@@ -7697,7 +7700,7 @@
         <p:spPr>
           <a:xfrm>
             <a:off x="7608600" y="6886080"/>
-            <a:ext cx="2277000" cy="356760"/>
+            <a:ext cx="2276640" cy="356400"/>
           </a:xfrm>
           <a:prstGeom prst="rect">
             <a:avLst/>
@@ -7779,7 +7782,7 @@
         <p:spPr>
           <a:xfrm>
             <a:off x="360000" y="360000"/>
-            <a:ext cx="9351720" cy="891720"/>
+            <a:ext cx="9351360" cy="891360"/>
           </a:xfrm>
           <a:prstGeom prst="rect">
             <a:avLst/>
@@ -7831,7 +7834,7 @@
         <p:spPr>
           <a:xfrm>
             <a:off x="897120" y="6886080"/>
-            <a:ext cx="6438960" cy="356760"/>
+            <a:ext cx="6438600" cy="356400"/>
           </a:xfrm>
           <a:prstGeom prst="rect">
             <a:avLst/>
@@ -7883,7 +7886,7 @@
         <p:spPr>
           <a:xfrm>
             <a:off x="7608600" y="6886080"/>
-            <a:ext cx="2277000" cy="356760"/>
+            <a:ext cx="2276640" cy="356400"/>
           </a:xfrm>
           <a:prstGeom prst="rect">
             <a:avLst/>
@@ -7935,7 +7938,7 @@
         <p:spPr>
           <a:xfrm>
             <a:off x="4026600" y="2912040"/>
-            <a:ext cx="3381480" cy="360000"/>
+            <a:ext cx="3381120" cy="359640"/>
           </a:xfrm>
           <a:prstGeom prst="rect">
             <a:avLst/>
@@ -7960,8 +7963,8 @@
         </p:nvSpPr>
         <p:spPr>
           <a:xfrm flipH="1" rot="10800000">
-            <a:off x="17998920" y="11129040"/>
-            <a:ext cx="699120" cy="355680"/>
+            <a:off x="17998560" y="11129400"/>
+            <a:ext cx="698760" cy="355320"/>
           </a:xfrm>
           <a:prstGeom prst="bentUpArrow">
             <a:avLst>
@@ -7995,8 +7998,8 @@
         </p:nvSpPr>
         <p:spPr>
           <a:xfrm rot="10800000">
-            <a:off x="16093440" y="11129040"/>
-            <a:ext cx="735480" cy="355680"/>
+            <a:off x="16093800" y="11129400"/>
+            <a:ext cx="735120" cy="355320"/>
           </a:xfrm>
           <a:prstGeom prst="bentUpArrow">
             <a:avLst>
@@ -8031,7 +8034,7 @@
         <p:spPr>
           <a:xfrm>
             <a:off x="663120" y="2354760"/>
-            <a:ext cx="1216080" cy="385920"/>
+            <a:ext cx="1215720" cy="385560"/>
           </a:xfrm>
           <a:prstGeom prst="rect">
             <a:avLst/>
@@ -8109,7 +8112,7 @@
         <p:spPr>
           <a:xfrm>
             <a:off x="2549160" y="3098160"/>
-            <a:ext cx="1217160" cy="258120"/>
+            <a:ext cx="1216800" cy="257760"/>
           </a:xfrm>
           <a:prstGeom prst="rect">
             <a:avLst/>
@@ -8166,7 +8169,7 @@
         <p:spPr>
           <a:xfrm>
             <a:off x="723960" y="6382080"/>
-            <a:ext cx="1094040" cy="385920"/>
+            <a:ext cx="1093680" cy="385560"/>
           </a:xfrm>
           <a:prstGeom prst="rect">
             <a:avLst/>
@@ -8223,7 +8226,7 @@
         <p:spPr>
           <a:xfrm>
             <a:off x="542520" y="2878560"/>
-            <a:ext cx="1457280" cy="693720"/>
+            <a:ext cx="1456920" cy="693360"/>
           </a:xfrm>
           <a:prstGeom prst="diamond">
             <a:avLst/>
@@ -8280,7 +8283,7 @@
         <p:spPr>
           <a:xfrm>
             <a:off x="1970640" y="2928600"/>
-            <a:ext cx="592200" cy="254880"/>
+            <a:ext cx="591840" cy="254520"/>
           </a:xfrm>
           <a:prstGeom prst="rect">
             <a:avLst/>
@@ -8332,7 +8335,7 @@
         <p:spPr>
           <a:xfrm>
             <a:off x="5310360" y="3706560"/>
-            <a:ext cx="1842120" cy="1582200"/>
+            <a:ext cx="1841760" cy="1581840"/>
           </a:xfrm>
           <a:prstGeom prst="rightArrow">
             <a:avLst>
@@ -8399,7 +8402,7 @@
         <p:spPr>
           <a:xfrm>
             <a:off x="7336800" y="2758680"/>
-            <a:ext cx="1755000" cy="3755880"/>
+            <a:ext cx="1754640" cy="3755520"/>
           </a:xfrm>
           <a:prstGeom prst="rect">
             <a:avLst/>
@@ -8779,7 +8782,7 @@
         <p:spPr>
           <a:xfrm>
             <a:off x="2000160" y="3225600"/>
-            <a:ext cx="548280" cy="1080"/>
+            <a:ext cx="547920" cy="720"/>
           </a:xfrm>
           <a:custGeom>
             <a:avLst/>
@@ -8827,7 +8830,7 @@
         <p:spPr>
           <a:xfrm>
             <a:off x="1271520" y="3572640"/>
-            <a:ext cx="360" cy="385920"/>
+            <a:ext cx="360" cy="385560"/>
           </a:xfrm>
           <a:custGeom>
             <a:avLst/>
@@ -8875,7 +8878,7 @@
         <p:spPr>
           <a:xfrm>
             <a:off x="588960" y="3560040"/>
-            <a:ext cx="735480" cy="230400"/>
+            <a:ext cx="735120" cy="230040"/>
           </a:xfrm>
           <a:prstGeom prst="rect">
             <a:avLst/>
@@ -8927,7 +8930,7 @@
         <p:spPr>
           <a:xfrm>
             <a:off x="1271520" y="2741400"/>
-            <a:ext cx="360" cy="136440"/>
+            <a:ext cx="360" cy="136080"/>
           </a:xfrm>
           <a:custGeom>
             <a:avLst/>
@@ -8975,7 +8978,7 @@
         <p:spPr>
           <a:xfrm>
             <a:off x="2553840" y="4069800"/>
-            <a:ext cx="1217160" cy="258120"/>
+            <a:ext cx="1216800" cy="257760"/>
           </a:xfrm>
           <a:prstGeom prst="rect">
             <a:avLst/>
@@ -9032,7 +9035,7 @@
         <p:spPr>
           <a:xfrm>
             <a:off x="547200" y="3850200"/>
-            <a:ext cx="1457280" cy="693720"/>
+            <a:ext cx="1456920" cy="693360"/>
           </a:xfrm>
           <a:prstGeom prst="diamond">
             <a:avLst/>
@@ -9089,7 +9092,7 @@
         <p:spPr>
           <a:xfrm>
             <a:off x="1975680" y="3900600"/>
-            <a:ext cx="592200" cy="254880"/>
+            <a:ext cx="591840" cy="254520"/>
           </a:xfrm>
           <a:prstGeom prst="rect">
             <a:avLst/>
@@ -9141,7 +9144,7 @@
         <p:spPr>
           <a:xfrm>
             <a:off x="2005200" y="4197600"/>
-            <a:ext cx="548280" cy="1080"/>
+            <a:ext cx="547920" cy="720"/>
           </a:xfrm>
           <a:custGeom>
             <a:avLst/>
@@ -9189,7 +9192,7 @@
         <p:spPr>
           <a:xfrm>
             <a:off x="1276200" y="4544640"/>
-            <a:ext cx="360" cy="385920"/>
+            <a:ext cx="360" cy="385560"/>
           </a:xfrm>
           <a:custGeom>
             <a:avLst/>
@@ -9237,7 +9240,7 @@
         <p:spPr>
           <a:xfrm>
             <a:off x="593640" y="4531680"/>
-            <a:ext cx="735480" cy="230400"/>
+            <a:ext cx="735120" cy="230040"/>
           </a:xfrm>
           <a:prstGeom prst="rect">
             <a:avLst/>
@@ -9289,7 +9292,7 @@
         <p:spPr>
           <a:xfrm>
             <a:off x="2549160" y="5030640"/>
-            <a:ext cx="1217160" cy="258120"/>
+            <a:ext cx="1216800" cy="257760"/>
           </a:xfrm>
           <a:prstGeom prst="rect">
             <a:avLst/>
@@ -9346,7 +9349,7 @@
         <p:spPr>
           <a:xfrm>
             <a:off x="542520" y="4811040"/>
-            <a:ext cx="1457280" cy="693720"/>
+            <a:ext cx="1456920" cy="693360"/>
           </a:xfrm>
           <a:prstGeom prst="diamond">
             <a:avLst/>
@@ -9403,7 +9406,7 @@
         <p:spPr>
           <a:xfrm>
             <a:off x="1970640" y="4861080"/>
-            <a:ext cx="592200" cy="254880"/>
+            <a:ext cx="591840" cy="254520"/>
           </a:xfrm>
           <a:prstGeom prst="rect">
             <a:avLst/>
@@ -9455,7 +9458,7 @@
         <p:spPr>
           <a:xfrm>
             <a:off x="2000160" y="5158080"/>
-            <a:ext cx="548280" cy="1080"/>
+            <a:ext cx="547920" cy="720"/>
           </a:xfrm>
           <a:custGeom>
             <a:avLst/>
@@ -9502,8 +9505,8 @@
         </p:nvSpPr>
         <p:spPr>
           <a:xfrm flipH="1">
-            <a:off x="1270080" y="5505480"/>
-            <a:ext cx="360" cy="300240"/>
+            <a:off x="1269360" y="5505480"/>
+            <a:ext cx="360" cy="299880"/>
           </a:xfrm>
           <a:custGeom>
             <a:avLst/>
@@ -9551,7 +9554,7 @@
         <p:spPr>
           <a:xfrm>
             <a:off x="588960" y="5408640"/>
-            <a:ext cx="735480" cy="230400"/>
+            <a:ext cx="735120" cy="230040"/>
           </a:xfrm>
           <a:prstGeom prst="rect">
             <a:avLst/>
@@ -9602,8 +9605,8 @@
         </p:nvSpPr>
         <p:spPr>
           <a:xfrm flipH="1">
-            <a:off x="1818000" y="3227400"/>
-            <a:ext cx="1947600" cy="3346920"/>
+            <a:off x="1817280" y="3227400"/>
+            <a:ext cx="1947240" cy="3346560"/>
           </a:xfrm>
           <a:prstGeom prst="bentConnector3">
             <a:avLst>
@@ -9640,7 +9643,7 @@
         <p:spPr>
           <a:xfrm flipH="1">
             <a:off x="1818000" y="4199400"/>
-            <a:ext cx="1952280" cy="2375280"/>
+            <a:ext cx="1951920" cy="2374920"/>
           </a:xfrm>
           <a:prstGeom prst="bentConnector3">
             <a:avLst>
@@ -9676,8 +9679,8 @@
         </p:nvSpPr>
         <p:spPr>
           <a:xfrm flipH="1">
-            <a:off x="1818000" y="5159880"/>
-            <a:ext cx="1947600" cy="1414440"/>
+            <a:off x="1817280" y="5159880"/>
+            <a:ext cx="1947240" cy="1414080"/>
           </a:xfrm>
           <a:prstGeom prst="bentConnector3">
             <a:avLst>
@@ -9714,7 +9717,7 @@
         <p:spPr>
           <a:xfrm>
             <a:off x="360000" y="1705680"/>
-            <a:ext cx="9171720" cy="4671720"/>
+            <a:ext cx="9171360" cy="4671360"/>
           </a:xfrm>
           <a:prstGeom prst="rect">
             <a:avLst/>
@@ -9808,7 +9811,7 @@
         <p:spPr>
           <a:xfrm>
             <a:off x="952200" y="5806440"/>
-            <a:ext cx="735480" cy="285840"/>
+            <a:ext cx="735120" cy="285480"/>
           </a:xfrm>
           <a:prstGeom prst="rect">
             <a:avLst/>
@@ -9870,7 +9873,7 @@
         <p:spPr>
           <a:xfrm>
             <a:off x="1725840" y="5932440"/>
-            <a:ext cx="822600" cy="3960"/>
+            <a:ext cx="822240" cy="3600"/>
           </a:xfrm>
           <a:custGeom>
             <a:avLst/>
@@ -9918,7 +9921,7 @@
         <p:spPr>
           <a:xfrm>
             <a:off x="2549160" y="5807520"/>
-            <a:ext cx="1217160" cy="258120"/>
+            <a:ext cx="1216800" cy="257760"/>
           </a:xfrm>
           <a:prstGeom prst="rect">
             <a:avLst/>
@@ -9974,8 +9977,8 @@
         </p:nvSpPr>
         <p:spPr>
           <a:xfrm flipH="1">
-            <a:off x="1818000" y="5937120"/>
-            <a:ext cx="1947600" cy="637560"/>
+            <a:off x="1817280" y="5937120"/>
+            <a:ext cx="1947240" cy="637200"/>
           </a:xfrm>
           <a:prstGeom prst="bentConnector3">
             <a:avLst>
@@ -10012,7 +10015,7 @@
         <p:spPr>
           <a:xfrm>
             <a:off x="229680" y="2476440"/>
-            <a:ext cx="99000" cy="4205520"/>
+            <a:ext cx="98640" cy="4205160"/>
           </a:xfrm>
           <a:prstGeom prst="downArrow">
             <a:avLst>
@@ -10083,7 +10086,7 @@
         <p:spPr>
           <a:xfrm>
             <a:off x="360000" y="360000"/>
-            <a:ext cx="9351720" cy="891720"/>
+            <a:ext cx="9351360" cy="891360"/>
           </a:xfrm>
           <a:prstGeom prst="rect">
             <a:avLst/>
@@ -10135,7 +10138,7 @@
         <p:spPr>
           <a:xfrm>
             <a:off x="897120" y="6886080"/>
-            <a:ext cx="6438960" cy="356760"/>
+            <a:ext cx="6438600" cy="356400"/>
           </a:xfrm>
           <a:prstGeom prst="rect">
             <a:avLst/>
@@ -10187,7 +10190,7 @@
         <p:spPr>
           <a:xfrm>
             <a:off x="7608600" y="6886080"/>
-            <a:ext cx="2277000" cy="356760"/>
+            <a:ext cx="2276640" cy="356400"/>
           </a:xfrm>
           <a:prstGeom prst="rect">
             <a:avLst/>
@@ -10239,7 +10242,7 @@
         <p:spPr>
           <a:xfrm>
             <a:off x="4026600" y="2912040"/>
-            <a:ext cx="3381480" cy="360000"/>
+            <a:ext cx="3381120" cy="359640"/>
           </a:xfrm>
           <a:prstGeom prst="rect">
             <a:avLst/>
@@ -10264,8 +10267,8 @@
         </p:nvSpPr>
         <p:spPr>
           <a:xfrm flipH="1" rot="16200000">
-            <a:off x="2737800" y="4174560"/>
-            <a:ext cx="399960" cy="1756440"/>
+            <a:off x="2738160" y="4174560"/>
+            <a:ext cx="399600" cy="1756080"/>
           </a:xfrm>
           <a:prstGeom prst="bentUpArrow">
             <a:avLst>
@@ -10300,7 +10303,7 @@
         <p:spPr>
           <a:xfrm>
             <a:off x="503640" y="1759680"/>
-            <a:ext cx="9172080" cy="4748400"/>
+            <a:ext cx="9171720" cy="4748040"/>
           </a:xfrm>
           <a:prstGeom prst="rect">
             <a:avLst/>
@@ -10622,7 +10625,7 @@
         <p:spPr>
           <a:xfrm>
             <a:off x="830520" y="2558160"/>
-            <a:ext cx="2643480" cy="3381120"/>
+            <a:ext cx="2643120" cy="3381120"/>
           </a:xfrm>
           <a:prstGeom prst="rect">
             <a:avLst/>
@@ -10900,7 +10903,7 @@
         <p:spPr>
           <a:xfrm>
             <a:off x="360000" y="360000"/>
-            <a:ext cx="9351720" cy="891720"/>
+            <a:ext cx="9351360" cy="891360"/>
           </a:xfrm>
           <a:prstGeom prst="rect">
             <a:avLst/>
@@ -10952,7 +10955,7 @@
         <p:spPr>
           <a:xfrm>
             <a:off x="897120" y="6886080"/>
-            <a:ext cx="6438960" cy="356760"/>
+            <a:ext cx="6438600" cy="356400"/>
           </a:xfrm>
           <a:prstGeom prst="rect">
             <a:avLst/>
@@ -11004,7 +11007,7 @@
         <p:spPr>
           <a:xfrm>
             <a:off x="7608600" y="6886080"/>
-            <a:ext cx="2277000" cy="356760"/>
+            <a:ext cx="2276640" cy="356400"/>
           </a:xfrm>
           <a:prstGeom prst="rect">
             <a:avLst/>
@@ -11056,7 +11059,7 @@
         <p:spPr>
           <a:xfrm>
             <a:off x="4026600" y="2912040"/>
-            <a:ext cx="3381480" cy="360000"/>
+            <a:ext cx="3381120" cy="359640"/>
           </a:xfrm>
           <a:prstGeom prst="rect">
             <a:avLst/>
@@ -11081,8 +11084,8 @@
         </p:nvSpPr>
         <p:spPr>
           <a:xfrm flipH="1" rot="16200000">
-            <a:off x="2737800" y="4174560"/>
-            <a:ext cx="399960" cy="1756440"/>
+            <a:off x="2738160" y="4174560"/>
+            <a:ext cx="399600" cy="1756080"/>
           </a:xfrm>
           <a:prstGeom prst="bentUpArrow">
             <a:avLst>
@@ -11117,7 +11120,7 @@
         <p:spPr>
           <a:xfrm>
             <a:off x="503640" y="1759680"/>
-            <a:ext cx="9172080" cy="4748400"/>
+            <a:ext cx="9171720" cy="4748040"/>
           </a:xfrm>
           <a:prstGeom prst="rect">
             <a:avLst/>
@@ -12142,7 +12145,7 @@
         <p:spPr>
           <a:xfrm>
             <a:off x="360000" y="360000"/>
-            <a:ext cx="9351720" cy="891720"/>
+            <a:ext cx="9351360" cy="891360"/>
           </a:xfrm>
           <a:prstGeom prst="rect">
             <a:avLst/>
@@ -12194,7 +12197,7 @@
         <p:spPr>
           <a:xfrm>
             <a:off x="897120" y="6886080"/>
-            <a:ext cx="6438960" cy="356760"/>
+            <a:ext cx="6438600" cy="356400"/>
           </a:xfrm>
           <a:prstGeom prst="rect">
             <a:avLst/>
@@ -12246,7 +12249,7 @@
         <p:spPr>
           <a:xfrm>
             <a:off x="7608600" y="6886080"/>
-            <a:ext cx="2277000" cy="356760"/>
+            <a:ext cx="2276640" cy="356400"/>
           </a:xfrm>
           <a:prstGeom prst="rect">
             <a:avLst/>
@@ -12298,7 +12301,7 @@
         <p:spPr>
           <a:xfrm>
             <a:off x="4026600" y="2912040"/>
-            <a:ext cx="3381480" cy="360000"/>
+            <a:ext cx="3381120" cy="359640"/>
           </a:xfrm>
           <a:prstGeom prst="rect">
             <a:avLst/>
@@ -12323,8 +12326,8 @@
         </p:nvSpPr>
         <p:spPr>
           <a:xfrm flipH="1" rot="16200000">
-            <a:off x="2737800" y="4174560"/>
-            <a:ext cx="399960" cy="1756440"/>
+            <a:off x="2738160" y="4174560"/>
+            <a:ext cx="399600" cy="1756080"/>
           </a:xfrm>
           <a:prstGeom prst="bentUpArrow">
             <a:avLst>
@@ -12359,7 +12362,7 @@
         <p:spPr>
           <a:xfrm>
             <a:off x="503640" y="1759680"/>
-            <a:ext cx="9172080" cy="4748400"/>
+            <a:ext cx="9171720" cy="4748040"/>
           </a:xfrm>
           <a:prstGeom prst="rect">
             <a:avLst/>
@@ -12457,6 +12460,12 @@
             </a:endParaRPr>
           </a:p>
           <a:p>
+            <a:pPr>
+              <a:lnSpc>
+                <a:spcPct val="100000"/>
+              </a:lnSpc>
+              <a:buNone/>
+            </a:pPr>
             <a:r>
               <a:rPr b="0" lang="pt-BR" sz="1800" spc="-1" strike="noStrike">
                 <a:solidFill>
@@ -12468,10 +12477,11 @@
               <a:t>Exercícios de Fixação: </a:t>
             </a:r>
             <a:r>
-              <a:rPr b="0" lang="pt-BR" sz="1800" spc="-1" strike="noStrike">
+              <a:rPr b="0" lang="pt-BR" sz="1800" spc="-1" strike="noStrike" u="sng">
                 <a:solidFill>
-                  <a:srgbClr val="1c1c1c"/>
+                  <a:srgbClr val="0000ff"/>
                 </a:solidFill>
+                <a:uFillTx/>
                 <a:latin typeface="Latin Modern Sans"/>
                 <a:ea typeface="DejaVu Sans"/>
                 <a:hlinkClick r:id="rId1"/>

</xml_diff>